<commit_message>
Ajuste Aula Python RAD 29maio2023
</commit_message>
<xml_diff>
--- a/01 Classes/Aula 12, 13 RAD Python - Banco de Dados.pptx
+++ b/01 Classes/Aula 12, 13 RAD Python - Banco de Dados.pptx
@@ -1313,7 +1313,7 @@
           <a:p>
             <a:fld id="{48A87A34-81AB-432B-8DAE-1953F412C126}" type="datetimeFigureOut">
               <a:rPr lang="en-US" smtClean="0"/>
-              <a:t>8/26/2022</a:t>
+              <a:t>5/29/2023</a:t>
             </a:fld>
             <a:endParaRPr lang="en-US" dirty="0"/>
           </a:p>
@@ -1524,7 +1524,7 @@
           <a:p>
             <a:fld id="{48A87A34-81AB-432B-8DAE-1953F412C126}" type="datetimeFigureOut">
               <a:rPr lang="en-US" smtClean="0"/>
-              <a:t>8/26/2022</a:t>
+              <a:t>5/29/2023</a:t>
             </a:fld>
             <a:endParaRPr lang="en-US" dirty="0"/>
           </a:p>
@@ -1739,7 +1739,7 @@
           <a:p>
             <a:fld id="{48A87A34-81AB-432B-8DAE-1953F412C126}" type="datetimeFigureOut">
               <a:rPr lang="en-US" smtClean="0"/>
-              <a:t>8/26/2022</a:t>
+              <a:t>5/29/2023</a:t>
             </a:fld>
             <a:endParaRPr lang="en-US" dirty="0"/>
           </a:p>
@@ -2107,7 +2107,7 @@
           <a:p>
             <a:fld id="{48A87A34-81AB-432B-8DAE-1953F412C126}" type="datetimeFigureOut">
               <a:rPr lang="en-US" smtClean="0"/>
-              <a:t>8/26/2022</a:t>
+              <a:t>5/29/2023</a:t>
             </a:fld>
             <a:endParaRPr lang="en-US" dirty="0"/>
           </a:p>
@@ -2386,7 +2386,7 @@
           <a:p>
             <a:fld id="{48A87A34-81AB-432B-8DAE-1953F412C126}" type="datetimeFigureOut">
               <a:rPr lang="en-US" smtClean="0"/>
-              <a:t>8/26/2022</a:t>
+              <a:t>5/29/2023</a:t>
             </a:fld>
             <a:endParaRPr lang="en-US" dirty="0"/>
           </a:p>
@@ -2654,7 +2654,7 @@
           <a:p>
             <a:fld id="{48A87A34-81AB-432B-8DAE-1953F412C126}" type="datetimeFigureOut">
               <a:rPr lang="en-US" smtClean="0"/>
-              <a:t>8/26/2022</a:t>
+              <a:t>5/29/2023</a:t>
             </a:fld>
             <a:endParaRPr lang="en-US" dirty="0"/>
           </a:p>
@@ -3070,7 +3070,7 @@
           <a:p>
             <a:fld id="{48A87A34-81AB-432B-8DAE-1953F412C126}" type="datetimeFigureOut">
               <a:rPr lang="en-US" smtClean="0"/>
-              <a:t>8/26/2022</a:t>
+              <a:t>5/29/2023</a:t>
             </a:fld>
             <a:endParaRPr lang="en-US" dirty="0"/>
           </a:p>
@@ -3219,7 +3219,7 @@
           <a:p>
             <a:fld id="{48A87A34-81AB-432B-8DAE-1953F412C126}" type="datetimeFigureOut">
               <a:rPr lang="en-US" smtClean="0"/>
-              <a:t>8/26/2022</a:t>
+              <a:t>5/29/2023</a:t>
             </a:fld>
             <a:endParaRPr lang="en-US" dirty="0"/>
           </a:p>
@@ -3345,7 +3345,7 @@
           <a:p>
             <a:fld id="{48A87A34-81AB-432B-8DAE-1953F412C126}" type="datetimeFigureOut">
               <a:rPr lang="en-US" smtClean="0"/>
-              <a:t>8/26/2022</a:t>
+              <a:t>5/29/2023</a:t>
             </a:fld>
             <a:endParaRPr lang="en-US" dirty="0"/>
           </a:p>
@@ -3596,7 +3596,7 @@
           <a:p>
             <a:fld id="{48A87A34-81AB-432B-8DAE-1953F412C126}" type="datetimeFigureOut">
               <a:rPr lang="en-US" smtClean="0"/>
-              <a:t>8/26/2022</a:t>
+              <a:t>5/29/2023</a:t>
             </a:fld>
             <a:endParaRPr lang="en-US" dirty="0"/>
           </a:p>
@@ -4042,7 +4042,7 @@
             <a:fld id="{48A87A34-81AB-432B-8DAE-1953F412C126}" type="datetimeFigureOut">
               <a:rPr lang="en-US" smtClean="0"/>
               <a:pPr/>
-              <a:t>8/26/2022</a:t>
+              <a:t>5/29/2023</a:t>
             </a:fld>
             <a:endParaRPr lang="en-US" dirty="0"/>
           </a:p>
@@ -4370,7 +4370,7 @@
             <a:fld id="{48A87A34-81AB-432B-8DAE-1953F412C126}" type="datetimeFigureOut">
               <a:rPr lang="en-US" smtClean="0"/>
               <a:pPr/>
-              <a:t>8/26/2022</a:t>
+              <a:t>5/29/2023</a:t>
             </a:fld>
             <a:endParaRPr lang="en-US" dirty="0"/>
           </a:p>
@@ -5838,8 +5838,8 @@
         </p:nvSpPr>
         <p:spPr>
           <a:xfrm>
-            <a:off x="142865" y="836895"/>
-            <a:ext cx="8865056" cy="4160989"/>
+            <a:off x="142865" y="702783"/>
+            <a:ext cx="8865056" cy="4344705"/>
           </a:xfrm>
         </p:spPr>
         <p:txBody>
@@ -5852,7 +5852,7 @@
               <a:buNone/>
             </a:pPr>
             <a:r>
-              <a:rPr lang="pt-BR" sz="2400" dirty="0">
+              <a:rPr lang="pt-BR" sz="2000" dirty="0">
                 <a:solidFill>
                   <a:schemeClr val="tx1"/>
                 </a:solidFill>
@@ -5862,7 +5862,7 @@
               <a:t>cursor = </a:t>
             </a:r>
             <a:r>
-              <a:rPr lang="pt-BR" sz="2400" dirty="0" err="1">
+              <a:rPr lang="pt-BR" sz="2000" dirty="0" err="1">
                 <a:solidFill>
                   <a:schemeClr val="tx1"/>
                 </a:solidFill>
@@ -5872,7 +5872,7 @@
               <a:t>conn.</a:t>
             </a:r>
             <a:r>
-              <a:rPr lang="pt-BR" sz="2400" b="1" dirty="0" err="1">
+              <a:rPr lang="pt-BR" sz="2000" b="1" dirty="0" err="1">
                 <a:solidFill>
                   <a:srgbClr val="FF0000"/>
                 </a:solidFill>
@@ -5882,7 +5882,7 @@
               <a:t>cursor</a:t>
             </a:r>
             <a:r>
-              <a:rPr lang="pt-BR" sz="2400" dirty="0">
+              <a:rPr lang="pt-BR" sz="2000" dirty="0">
                 <a:solidFill>
                   <a:schemeClr val="tx1"/>
                 </a:solidFill>
@@ -5897,13 +5897,13 @@
               <a:buNone/>
             </a:pPr>
             <a:r>
-              <a:rPr lang="pt-BR" sz="2400" dirty="0">
+              <a:rPr lang="pt-BR" sz="2000" dirty="0">
                 <a:latin typeface="Times New Roman" panose="02020603050405020304" pitchFamily="18" charset="0"/>
                 <a:cs typeface="Times New Roman" panose="02020603050405020304" pitchFamily="18" charset="0"/>
               </a:rPr>
               <a:t>id = 63</a:t>
             </a:r>
-            <a:endParaRPr lang="pt-BR" sz="2400" dirty="0">
+            <a:endParaRPr lang="pt-BR" sz="2000" dirty="0">
               <a:solidFill>
                 <a:schemeClr val="tx1"/>
               </a:solidFill>
@@ -5916,21 +5916,21 @@
               <a:buNone/>
             </a:pPr>
             <a:r>
-              <a:rPr lang="pt-BR" sz="2400" dirty="0" err="1">
+              <a:rPr lang="pt-BR" sz="2000" dirty="0" err="1">
                 <a:latin typeface="Times New Roman" panose="02020603050405020304" pitchFamily="18" charset="0"/>
                 <a:cs typeface="Times New Roman" panose="02020603050405020304" pitchFamily="18" charset="0"/>
               </a:rPr>
               <a:t>sql</a:t>
             </a:r>
             <a:r>
-              <a:rPr lang="pt-BR" sz="2400" dirty="0">
+              <a:rPr lang="pt-BR" sz="2000" dirty="0">
                 <a:latin typeface="Times New Roman" panose="02020603050405020304" pitchFamily="18" charset="0"/>
                 <a:cs typeface="Times New Roman" panose="02020603050405020304" pitchFamily="18" charset="0"/>
               </a:rPr>
               <a:t> = </a:t>
             </a:r>
             <a:r>
-              <a:rPr lang="pt-BR" sz="2400" b="1" dirty="0" err="1">
+              <a:rPr lang="pt-BR" sz="2000" b="1" dirty="0" err="1">
                 <a:solidFill>
                   <a:srgbClr val="FF0000"/>
                 </a:solidFill>
@@ -5940,63 +5940,63 @@
               <a:t>f</a:t>
             </a:r>
             <a:r>
-              <a:rPr lang="pt-BR" sz="2400" dirty="0" err="1">
+              <a:rPr lang="pt-BR" sz="2000" dirty="0" err="1">
                 <a:latin typeface="Times New Roman" panose="02020603050405020304" pitchFamily="18" charset="0"/>
                 <a:cs typeface="Times New Roman" panose="02020603050405020304" pitchFamily="18" charset="0"/>
               </a:rPr>
               <a:t>“</a:t>
             </a:r>
             <a:r>
-              <a:rPr lang="pt-BR" sz="2400" b="1" dirty="0" err="1">
+              <a:rPr lang="pt-BR" sz="2000" b="1" dirty="0" err="1">
                 <a:latin typeface="Times New Roman" panose="02020603050405020304" pitchFamily="18" charset="0"/>
                 <a:cs typeface="Times New Roman" panose="02020603050405020304" pitchFamily="18" charset="0"/>
               </a:rPr>
               <a:t>delete</a:t>
             </a:r>
             <a:r>
-              <a:rPr lang="pt-BR" sz="2400" dirty="0">
+              <a:rPr lang="pt-BR" sz="2000" dirty="0">
                 <a:latin typeface="Times New Roman" panose="02020603050405020304" pitchFamily="18" charset="0"/>
                 <a:cs typeface="Times New Roman" panose="02020603050405020304" pitchFamily="18" charset="0"/>
               </a:rPr>
               <a:t> </a:t>
             </a:r>
             <a:r>
-              <a:rPr lang="pt-BR" sz="2400" b="1" dirty="0" err="1">
+              <a:rPr lang="pt-BR" sz="2000" b="1" dirty="0" err="1">
                 <a:latin typeface="Times New Roman" panose="02020603050405020304" pitchFamily="18" charset="0"/>
                 <a:cs typeface="Times New Roman" panose="02020603050405020304" pitchFamily="18" charset="0"/>
               </a:rPr>
               <a:t>from</a:t>
             </a:r>
             <a:r>
-              <a:rPr lang="pt-BR" sz="2400" b="1" dirty="0">
+              <a:rPr lang="pt-BR" sz="2000" b="1" dirty="0">
                 <a:latin typeface="Times New Roman" panose="02020603050405020304" pitchFamily="18" charset="0"/>
                 <a:cs typeface="Times New Roman" panose="02020603050405020304" pitchFamily="18" charset="0"/>
               </a:rPr>
               <a:t> </a:t>
             </a:r>
             <a:r>
-              <a:rPr lang="pt-BR" sz="2400" dirty="0" err="1">
+              <a:rPr lang="pt-BR" sz="2000" dirty="0" err="1">
                 <a:latin typeface="Times New Roman" panose="02020603050405020304" pitchFamily="18" charset="0"/>
                 <a:cs typeface="Times New Roman" panose="02020603050405020304" pitchFamily="18" charset="0"/>
               </a:rPr>
               <a:t>department</a:t>
             </a:r>
             <a:r>
-              <a:rPr lang="pt-BR" sz="2400" dirty="0">
+              <a:rPr lang="pt-BR" sz="2000" dirty="0">
                 <a:latin typeface="Times New Roman" panose="02020603050405020304" pitchFamily="18" charset="0"/>
                 <a:cs typeface="Times New Roman" panose="02020603050405020304" pitchFamily="18" charset="0"/>
               </a:rPr>
               <a:t> </a:t>
             </a:r>
             <a:r>
-              <a:rPr lang="pt-BR" sz="2400" b="1" dirty="0" err="1">
+              <a:rPr lang="pt-BR" sz="2000" b="1" dirty="0" err="1">
                 <a:latin typeface="Times New Roman" panose="02020603050405020304" pitchFamily="18" charset="0"/>
                 <a:cs typeface="Times New Roman" panose="02020603050405020304" pitchFamily="18" charset="0"/>
               </a:rPr>
               <a:t>where</a:t>
             </a:r>
             <a:r>
-              <a:rPr lang="pt-BR" sz="2400" dirty="0">
+              <a:rPr lang="pt-BR" sz="2000" dirty="0">
                 <a:latin typeface="Times New Roman" panose="02020603050405020304" pitchFamily="18" charset="0"/>
                 <a:cs typeface="Times New Roman" panose="02020603050405020304" pitchFamily="18" charset="0"/>
               </a:rPr>
@@ -6008,14 +6008,14 @@
               <a:buNone/>
             </a:pPr>
             <a:r>
-              <a:rPr lang="pt-BR" sz="2400" dirty="0" err="1">
+              <a:rPr lang="pt-BR" sz="2000" dirty="0" err="1">
                 <a:latin typeface="Times New Roman" panose="02020603050405020304" pitchFamily="18" charset="0"/>
                 <a:cs typeface="Times New Roman" panose="02020603050405020304" pitchFamily="18" charset="0"/>
               </a:rPr>
               <a:t>cursor.</a:t>
             </a:r>
             <a:r>
-              <a:rPr lang="pt-BR" sz="2400" b="1" dirty="0" err="1">
+              <a:rPr lang="pt-BR" sz="2000" b="1" dirty="0" err="1">
                 <a:solidFill>
                   <a:srgbClr val="FF0000"/>
                 </a:solidFill>
@@ -6025,21 +6025,21 @@
               <a:t>execute</a:t>
             </a:r>
             <a:r>
-              <a:rPr lang="pt-BR" sz="2400" dirty="0">
+              <a:rPr lang="pt-BR" sz="2000" dirty="0">
                 <a:latin typeface="Times New Roman" panose="02020603050405020304" pitchFamily="18" charset="0"/>
                 <a:cs typeface="Times New Roman" panose="02020603050405020304" pitchFamily="18" charset="0"/>
               </a:rPr>
               <a:t>(</a:t>
             </a:r>
             <a:r>
-              <a:rPr lang="pt-BR" sz="2400" dirty="0" err="1">
+              <a:rPr lang="pt-BR" sz="2000" dirty="0" err="1">
                 <a:latin typeface="Times New Roman" panose="02020603050405020304" pitchFamily="18" charset="0"/>
                 <a:cs typeface="Times New Roman" panose="02020603050405020304" pitchFamily="18" charset="0"/>
               </a:rPr>
               <a:t>sql</a:t>
             </a:r>
             <a:r>
-              <a:rPr lang="pt-BR" sz="2400" dirty="0">
+              <a:rPr lang="pt-BR" sz="2000" dirty="0">
                 <a:latin typeface="Times New Roman" panose="02020603050405020304" pitchFamily="18" charset="0"/>
                 <a:cs typeface="Times New Roman" panose="02020603050405020304" pitchFamily="18" charset="0"/>
               </a:rPr>
@@ -6051,14 +6051,14 @@
               <a:buNone/>
             </a:pPr>
             <a:r>
-              <a:rPr lang="pt-BR" sz="2400" dirty="0">
+              <a:rPr lang="pt-BR" sz="2000" dirty="0">
                 <a:latin typeface="Times New Roman" panose="02020603050405020304" pitchFamily="18" charset="0"/>
                 <a:cs typeface="Times New Roman" panose="02020603050405020304" pitchFamily="18" charset="0"/>
               </a:rPr>
               <a:t>linha = </a:t>
             </a:r>
             <a:r>
-              <a:rPr lang="pt-BR" sz="2400" dirty="0" err="1">
+              <a:rPr lang="pt-BR" sz="2000" dirty="0" err="1">
                 <a:solidFill>
                   <a:schemeClr val="tx1"/>
                 </a:solidFill>
@@ -6068,7 +6068,7 @@
               <a:t>cursor.</a:t>
             </a:r>
             <a:r>
-              <a:rPr lang="pt-BR" sz="2400" b="1" dirty="0" err="1">
+              <a:rPr lang="pt-BR" sz="2000" b="1" dirty="0" err="1">
                 <a:solidFill>
                   <a:srgbClr val="FF0000"/>
                 </a:solidFill>
@@ -6078,7 +6078,7 @@
               <a:t>fetchone</a:t>
             </a:r>
             <a:r>
-              <a:rPr lang="pt-BR" sz="2400" dirty="0">
+              <a:rPr lang="pt-BR" sz="2000" dirty="0">
                 <a:solidFill>
                   <a:schemeClr val="tx1"/>
                 </a:solidFill>
@@ -6093,35 +6093,35 @@
               <a:buNone/>
             </a:pPr>
             <a:r>
-              <a:rPr lang="pt-BR" sz="2400" dirty="0" err="1">
+              <a:rPr lang="pt-BR" sz="2000" b="1" dirty="0" err="1">
                 <a:latin typeface="Times New Roman" panose="02020603050405020304" pitchFamily="18" charset="0"/>
                 <a:cs typeface="Times New Roman" panose="02020603050405020304" pitchFamily="18" charset="0"/>
               </a:rPr>
               <a:t>if</a:t>
             </a:r>
             <a:r>
-              <a:rPr lang="pt-BR" sz="2400" dirty="0">
+              <a:rPr lang="pt-BR" sz="2000" dirty="0">
                 <a:latin typeface="Times New Roman" panose="02020603050405020304" pitchFamily="18" charset="0"/>
                 <a:cs typeface="Times New Roman" panose="02020603050405020304" pitchFamily="18" charset="0"/>
               </a:rPr>
               <a:t> (linha != </a:t>
             </a:r>
             <a:r>
-              <a:rPr lang="pt-BR" sz="2400" dirty="0" err="1">
+              <a:rPr lang="pt-BR" sz="2000" b="1" dirty="0" err="1">
                 <a:latin typeface="Times New Roman" panose="02020603050405020304" pitchFamily="18" charset="0"/>
                 <a:cs typeface="Times New Roman" panose="02020603050405020304" pitchFamily="18" charset="0"/>
               </a:rPr>
               <a:t>None</a:t>
             </a:r>
             <a:r>
-              <a:rPr lang="pt-BR" sz="2400" dirty="0">
+              <a:rPr lang="pt-BR" sz="2000" dirty="0">
                 <a:latin typeface="Times New Roman" panose="02020603050405020304" pitchFamily="18" charset="0"/>
                 <a:cs typeface="Times New Roman" panose="02020603050405020304" pitchFamily="18" charset="0"/>
               </a:rPr>
               <a:t>): # ou </a:t>
             </a:r>
             <a:r>
-              <a:rPr lang="pt-BR" sz="2400" b="1" dirty="0" err="1">
+              <a:rPr lang="pt-BR" sz="2000" b="1" dirty="0" err="1">
                 <a:solidFill>
                   <a:srgbClr val="FF0000"/>
                 </a:solidFill>
@@ -6131,7 +6131,7 @@
               <a:t>linha.rowcount</a:t>
             </a:r>
             <a:r>
-              <a:rPr lang="pt-BR" sz="2400" b="1" dirty="0">
+              <a:rPr lang="pt-BR" sz="2000" b="1" dirty="0">
                 <a:solidFill>
                   <a:srgbClr val="FF0000"/>
                 </a:solidFill>
@@ -6146,21 +6146,21 @@
               <a:buNone/>
             </a:pPr>
             <a:r>
-              <a:rPr lang="pt-BR" sz="2400" dirty="0">
+              <a:rPr lang="pt-BR" sz="2000" dirty="0">
                 <a:latin typeface="Times New Roman" panose="02020603050405020304" pitchFamily="18" charset="0"/>
                 <a:cs typeface="Times New Roman" panose="02020603050405020304" pitchFamily="18" charset="0"/>
               </a:rPr>
               <a:t>    </a:t>
             </a:r>
             <a:r>
-              <a:rPr lang="pt-BR" sz="2400" dirty="0" err="1">
+              <a:rPr lang="pt-BR" sz="2000" dirty="0" err="1">
                 <a:latin typeface="Times New Roman" panose="02020603050405020304" pitchFamily="18" charset="0"/>
                 <a:cs typeface="Times New Roman" panose="02020603050405020304" pitchFamily="18" charset="0"/>
               </a:rPr>
               <a:t>conn.</a:t>
             </a:r>
             <a:r>
-              <a:rPr lang="pt-BR" sz="2400" b="1" dirty="0" err="1">
+              <a:rPr lang="pt-BR" sz="2000" b="1" dirty="0" err="1">
                 <a:solidFill>
                   <a:srgbClr val="FF0000"/>
                 </a:solidFill>
@@ -6170,7 +6170,7 @@
               <a:t>commit</a:t>
             </a:r>
             <a:r>
-              <a:rPr lang="pt-BR" sz="2400" dirty="0">
+              <a:rPr lang="pt-BR" sz="2000" dirty="0">
                 <a:latin typeface="Times New Roman" panose="02020603050405020304" pitchFamily="18" charset="0"/>
                 <a:cs typeface="Times New Roman" panose="02020603050405020304" pitchFamily="18" charset="0"/>
               </a:rPr>
@@ -6182,20 +6182,64 @@
               <a:buNone/>
             </a:pPr>
             <a:r>
-              <a:rPr lang="pt-BR" sz="2400" b="1" dirty="0">
+              <a:rPr lang="pt-BR" sz="2000" b="1" dirty="0">
                 <a:latin typeface="Times New Roman" panose="02020603050405020304" pitchFamily="18" charset="0"/>
                 <a:cs typeface="Times New Roman" panose="02020603050405020304" pitchFamily="18" charset="0"/>
               </a:rPr>
               <a:t>    print</a:t>
             </a:r>
             <a:r>
-              <a:rPr lang="pt-BR" sz="2400" dirty="0">
+              <a:rPr lang="pt-BR" sz="2000" dirty="0">
                 <a:latin typeface="Times New Roman" panose="02020603050405020304" pitchFamily="18" charset="0"/>
                 <a:cs typeface="Times New Roman" panose="02020603050405020304" pitchFamily="18" charset="0"/>
               </a:rPr>
               <a:t>(“Excluído com sucesso")</a:t>
             </a:r>
-            <a:endParaRPr lang="pt-BR" sz="2400" dirty="0">
+          </a:p>
+          <a:p>
+            <a:pPr marL="0" indent="0" algn="just">
+              <a:buNone/>
+            </a:pPr>
+            <a:r>
+              <a:rPr lang="pt-BR" sz="2000" b="1" dirty="0" err="1">
+                <a:solidFill>
+                  <a:schemeClr val="tx1"/>
+                </a:solidFill>
+                <a:latin typeface="Times New Roman" panose="02020603050405020304" pitchFamily="18" charset="0"/>
+                <a:cs typeface="Times New Roman" panose="02020603050405020304" pitchFamily="18" charset="0"/>
+              </a:rPr>
+              <a:t>else</a:t>
+            </a:r>
+            <a:r>
+              <a:rPr lang="pt-BR" sz="2000" dirty="0">
+                <a:solidFill>
+                  <a:schemeClr val="tx1"/>
+                </a:solidFill>
+                <a:latin typeface="Times New Roman" panose="02020603050405020304" pitchFamily="18" charset="0"/>
+                <a:cs typeface="Times New Roman" panose="02020603050405020304" pitchFamily="18" charset="0"/>
+              </a:rPr>
+              <a:t>:</a:t>
+            </a:r>
+          </a:p>
+          <a:p>
+            <a:pPr marL="0" indent="0" algn="just">
+              <a:buNone/>
+            </a:pPr>
+            <a:r>
+              <a:rPr lang="pt-BR" sz="2000" b="1" dirty="0">
+                <a:latin typeface="Times New Roman" panose="02020603050405020304" pitchFamily="18" charset="0"/>
+                <a:cs typeface="Times New Roman" panose="02020603050405020304" pitchFamily="18" charset="0"/>
+              </a:rPr>
+              <a:t>    print</a:t>
+            </a:r>
+            <a:r>
+              <a:rPr lang="pt-BR" sz="2000" dirty="0">
+                <a:latin typeface="Times New Roman" panose="02020603050405020304" pitchFamily="18" charset="0"/>
+                <a:cs typeface="Times New Roman" panose="02020603050405020304" pitchFamily="18" charset="0"/>
+              </a:rPr>
+              <a:t>(“Registro não encontrado!!!")</a:t>
+            </a:r>
+            <a:endParaRPr lang="pt-BR" sz="2000" dirty="0">
               <a:solidFill>
                 <a:schemeClr val="tx1"/>
               </a:solidFill>
@@ -6310,7 +6354,7 @@
             <a:pPr marL="0" indent="0" algn="just">
               <a:buNone/>
             </a:pPr>
-            <a:endParaRPr lang="pt-BR" dirty="0">
+            <a:endParaRPr lang="pt-BR" sz="2400" dirty="0">
               <a:latin typeface="Times New Roman" panose="02020603050405020304" pitchFamily="18" charset="0"/>
               <a:cs typeface="Times New Roman" panose="02020603050405020304" pitchFamily="18" charset="0"/>
             </a:endParaRPr>
@@ -6319,7 +6363,7 @@
             <a:pPr marL="0" indent="0" algn="just">
               <a:buNone/>
             </a:pPr>
-            <a:endParaRPr lang="pt-BR" dirty="0">
+            <a:endParaRPr lang="pt-BR" sz="2400" dirty="0">
               <a:latin typeface="Times New Roman" panose="02020603050405020304" pitchFamily="18" charset="0"/>
               <a:cs typeface="Times New Roman" panose="02020603050405020304" pitchFamily="18" charset="0"/>
             </a:endParaRPr>
@@ -6329,14 +6373,14 @@
               <a:buNone/>
             </a:pPr>
             <a:r>
-              <a:rPr lang="pt-BR" dirty="0">
+              <a:rPr lang="pt-BR" sz="2400" dirty="0">
                 <a:latin typeface="Times New Roman" panose="02020603050405020304" pitchFamily="18" charset="0"/>
                 <a:cs typeface="Times New Roman" panose="02020603050405020304" pitchFamily="18" charset="0"/>
               </a:rPr>
               <a:t>[1] Site: </a:t>
             </a:r>
             <a:r>
-              <a:rPr lang="pt-BR" dirty="0">
+              <a:rPr lang="pt-BR" sz="2400" dirty="0">
                 <a:solidFill>
                   <a:srgbClr val="0070C0"/>
                 </a:solidFill>
@@ -6352,7 +6396,7 @@
               </a:rPr>
               <a:t>https://www.w3schools.com/sql/default.asp</a:t>
             </a:r>
-            <a:endParaRPr lang="pt-BR" dirty="0">
+            <a:endParaRPr lang="pt-BR" sz="2400" dirty="0">
               <a:solidFill>
                 <a:srgbClr val="0070C0"/>
               </a:solidFill>
@@ -6365,7 +6409,7 @@
               <a:buNone/>
             </a:pPr>
             <a:r>
-              <a:rPr lang="pt-BR" dirty="0">
+              <a:rPr lang="pt-BR" sz="2400" dirty="0">
                 <a:solidFill>
                   <a:srgbClr val="0070C0"/>
                 </a:solidFill>
@@ -6375,7 +6419,7 @@
               <a:t> 	      </a:t>
             </a:r>
             <a:r>
-              <a:rPr lang="pt-BR" dirty="0">
+              <a:rPr lang="pt-BR" sz="2400" dirty="0">
                 <a:solidFill>
                   <a:srgbClr val="0070C0"/>
                 </a:solidFill>
@@ -6391,7 +6435,7 @@
               </a:rPr>
               <a:t>https://www.w3schools.com/sql/sql_intro.asp</a:t>
             </a:r>
-            <a:endParaRPr lang="pt-BR" dirty="0">
+            <a:endParaRPr lang="pt-BR" sz="2400" dirty="0">
               <a:solidFill>
                 <a:srgbClr val="0070C0"/>
               </a:solidFill>
@@ -6403,7 +6447,7 @@
             <a:pPr marL="0" indent="0" algn="just">
               <a:buNone/>
             </a:pPr>
-            <a:endParaRPr lang="pt-BR" dirty="0">
+            <a:endParaRPr lang="pt-BR" sz="2400" dirty="0">
               <a:solidFill>
                 <a:srgbClr val="0070C0"/>
               </a:solidFill>
@@ -9396,7 +9440,17 @@
                 <a:latin typeface="Times New Roman" panose="02020603050405020304" pitchFamily="18" charset="0"/>
                 <a:cs typeface="Times New Roman" panose="02020603050405020304" pitchFamily="18" charset="0"/>
               </a:rPr>
-              <a:t>conn.get_server_info</a:t>
+              <a:t>conn.</a:t>
+            </a:r>
+            <a:r>
+              <a:rPr lang="pt-BR" sz="2400" b="1" dirty="0" err="1">
+                <a:solidFill>
+                  <a:schemeClr val="tx1"/>
+                </a:solidFill>
+                <a:latin typeface="Times New Roman" panose="02020603050405020304" pitchFamily="18" charset="0"/>
+                <a:cs typeface="Times New Roman" panose="02020603050405020304" pitchFamily="18" charset="0"/>
+              </a:rPr>
+              <a:t>get_server_info</a:t>
             </a:r>
             <a:r>
               <a:rPr lang="pt-BR" sz="2400" dirty="0">
@@ -10660,7 +10714,7 @@
                 <a:latin typeface="Times New Roman" panose="02020603050405020304" pitchFamily="18" charset="0"/>
                 <a:cs typeface="Times New Roman" panose="02020603050405020304" pitchFamily="18" charset="0"/>
               </a:rPr>
-              <a:t>(“Inserido com sucesso”</a:t>
+              <a:t>(‘Inserido com sucesso’)</a:t>
             </a:r>
             <a:endParaRPr lang="pt-BR" sz="2400" dirty="0">
               <a:solidFill>

</xml_diff>